<commit_message>
Added English to PPT title.
</commit_message>
<xml_diff>
--- a/data/templates_combo/simple.pptx
+++ b/data/templates_combo/simple.pptx
@@ -174,8 +174,8 @@
         </p:nvSpPr>
         <p:spPr>
           <a:xfrm>
-            <a:off x="3490333" y="263769"/>
-            <a:ext cx="2212199" cy="459852"/>
+            <a:off x="2709746" y="263769"/>
+            <a:ext cx="3773373" cy="459852"/>
           </a:xfrm>
         </p:spPr>
         <p:txBody>
@@ -403,7 +403,7 @@
         <p:spPr>
           <a:xfrm>
             <a:off x="236349" y="263769"/>
-            <a:ext cx="3253984" cy="459852"/>
+            <a:ext cx="2473397" cy="459852"/>
           </a:xfrm>
         </p:spPr>
         <p:txBody>
@@ -445,8 +445,8 @@
         </p:nvSpPr>
         <p:spPr>
           <a:xfrm>
-            <a:off x="5702532" y="263769"/>
-            <a:ext cx="3291999" cy="459852"/>
+            <a:off x="6483119" y="263769"/>
+            <a:ext cx="2511412" cy="459852"/>
           </a:xfrm>
         </p:spPr>
         <p:txBody>
@@ -560,8 +560,8 @@
         </p:nvSpPr>
         <p:spPr>
           <a:xfrm>
-            <a:off x="3501483" y="263768"/>
-            <a:ext cx="2201049" cy="457614"/>
+            <a:off x="2587083" y="263768"/>
+            <a:ext cx="4029849" cy="457614"/>
           </a:xfrm>
         </p:spPr>
         <p:txBody>
@@ -775,7 +775,7 @@
         <p:spPr>
           <a:xfrm>
             <a:off x="236348" y="263769"/>
-            <a:ext cx="3265135" cy="459852"/>
+            <a:ext cx="2350735" cy="459852"/>
           </a:xfrm>
         </p:spPr>
         <p:txBody>
@@ -817,8 +817,8 @@
         </p:nvSpPr>
         <p:spPr>
           <a:xfrm>
-            <a:off x="5702532" y="263769"/>
-            <a:ext cx="3291999" cy="459852"/>
+            <a:off x="6616932" y="263769"/>
+            <a:ext cx="2377599" cy="459852"/>
           </a:xfrm>
         </p:spPr>
         <p:txBody>
@@ -961,8 +961,8 @@
         </p:nvSpPr>
         <p:spPr>
           <a:xfrm>
-            <a:off x="3458253" y="263769"/>
-            <a:ext cx="2244279" cy="459852"/>
+            <a:off x="2637323" y="263769"/>
+            <a:ext cx="3886140" cy="459852"/>
           </a:xfrm>
         </p:spPr>
         <p:txBody>
@@ -1176,7 +1176,7 @@
         <p:spPr>
           <a:xfrm>
             <a:off x="236348" y="263769"/>
-            <a:ext cx="3221905" cy="459852"/>
+            <a:ext cx="2400974" cy="459852"/>
           </a:xfrm>
         </p:spPr>
         <p:txBody>
@@ -1218,8 +1218,8 @@
         </p:nvSpPr>
         <p:spPr>
           <a:xfrm>
-            <a:off x="5702532" y="263769"/>
-            <a:ext cx="3291999" cy="459852"/>
+            <a:off x="6523463" y="263769"/>
+            <a:ext cx="2471068" cy="459852"/>
           </a:xfrm>
         </p:spPr>
         <p:txBody>
@@ -1333,8 +1333,8 @@
         </p:nvSpPr>
         <p:spPr>
           <a:xfrm>
-            <a:off x="3468029" y="263769"/>
-            <a:ext cx="2234503" cy="459852"/>
+            <a:off x="2537760" y="263769"/>
+            <a:ext cx="4095042" cy="459852"/>
           </a:xfrm>
         </p:spPr>
         <p:txBody>
@@ -1908,7 +1908,7 @@
         <p:spPr>
           <a:xfrm>
             <a:off x="236348" y="263769"/>
-            <a:ext cx="3231681" cy="459852"/>
+            <a:ext cx="2301411" cy="459852"/>
           </a:xfrm>
         </p:spPr>
         <p:txBody>
@@ -1950,8 +1950,8 @@
         </p:nvSpPr>
         <p:spPr>
           <a:xfrm>
-            <a:off x="5702532" y="263769"/>
-            <a:ext cx="3291999" cy="459852"/>
+            <a:off x="6632802" y="263769"/>
+            <a:ext cx="2361729" cy="459852"/>
           </a:xfrm>
         </p:spPr>
         <p:txBody>
@@ -2182,7 +2182,7 @@
             <a:fld id="{48A87A34-81AB-432B-8DAE-1953F412C126}" type="datetimeFigureOut">
               <a:rPr lang="en-US" smtClean="0"/>
               <a:pPr/>
-              <a:t>8/30/2017</a:t>
+              <a:t>9/1/2017</a:t>
             </a:fld>
             <a:endParaRPr lang="en-US" dirty="0"/>
           </a:p>

</xml_diff>